<commit_message>
Set up practice trials
</commit_message>
<xml_diff>
--- a/Instructions/instructions_adapted.pptx
+++ b/Instructions/instructions_adapted.pptx
@@ -7901,7 +7901,7 @@
                 <a:latin typeface="Arial" panose="020B0604020202020204" pitchFamily="34" charset="0"/>
                 <a:cs typeface="Arial" panose="020B0604020202020204" pitchFamily="34" charset="0"/>
               </a:rPr>
-              <a:t>The next series of blocks will be in the ”Fixed" mode. In this game mode, if you correctly choose the majority colour, you will win 100 points, regardless of the number of tiles you have selected. However, if your choice is incorrect, you will lose 100 points, also regardless of the number of tiles seen.</a:t>
+              <a:t>This trial is an example of the “Fixed” mode. In this game mode, if you correctly choose the majority colour, you will win 100 points, regardless of the number of tiles you have turned over. However, if your choice is incorrect, you will lose 100 points, also regardless of the number of tiles seen.</a:t>
             </a:r>
           </a:p>
           <a:p>
@@ -7930,7 +7930,7 @@
                 <a:latin typeface="Arial" panose="020B0604020202020204" pitchFamily="34" charset="0"/>
                 <a:cs typeface="Arial" panose="020B0604020202020204" pitchFamily="34" charset="0"/>
               </a:rPr>
-              <a:t>You will now practice the task for a few trials.</a:t>
+              <a:t>Occasionally, you will be asked about how confident you are on which is the majority colour.</a:t>
             </a:r>
           </a:p>
         </p:txBody>
@@ -7950,7 +7950,7 @@
         <p:spPr>
           <a:xfrm>
             <a:off x="1833904" y="5129004"/>
-            <a:ext cx="5476179" cy="523220"/>
+            <a:ext cx="5137368" cy="523220"/>
           </a:xfrm>
           <a:prstGeom prst="rect">
             <a:avLst/>
@@ -7974,7 +7974,7 @@
                 <a:latin typeface="Arial" panose="020B0604020202020204" pitchFamily="34" charset="0"/>
                 <a:cs typeface="Arial" panose="020B0604020202020204" pitchFamily="34" charset="0"/>
               </a:rPr>
-              <a:t>[Click to start the Practice Phase]</a:t>
+              <a:t>[Click to start the Practice Trial]</a:t>
             </a:r>
           </a:p>
         </p:txBody>
@@ -8276,7 +8276,7 @@
         <p:spPr>
           <a:xfrm>
             <a:off x="476838" y="332656"/>
-            <a:ext cx="8190305" cy="4832092"/>
+            <a:ext cx="8190305" cy="5262979"/>
           </a:xfrm>
           <a:prstGeom prst="rect">
             <a:avLst/>
@@ -8301,7 +8301,7 @@
                 <a:latin typeface="Arial" panose="020B0604020202020204" pitchFamily="34" charset="0"/>
                 <a:cs typeface="Arial" panose="020B0604020202020204" pitchFamily="34" charset="0"/>
               </a:rPr>
-              <a:t>The next series of blocks will be in the "Decreasing" mode. In this game mode, the number of points you earn for a correct answer will vary: if you correctly choose the majority colour, you will win 10 points for every uncovered tile remaining on the board. However, if your choice is incorrect, you will lose 100 points, regardless of the number of tiles you have seen. </a:t>
+              <a:t>This trial is an example of the "Decreasing" mode. In this game mode, the number of points you earn for a correct answer will vary: if you correctly choose the majority colour, you will win 10 points for every uncovered tile remaining on the board. However, if your choice is incorrect, you will lose 100 points, regardless of the number of tiles you have seen. </a:t>
             </a:r>
           </a:p>
           <a:p>
@@ -8343,7 +8343,7 @@
                 <a:latin typeface="Arial" panose="020B0604020202020204" pitchFamily="34" charset="0"/>
                 <a:cs typeface="Arial" panose="020B0604020202020204" pitchFamily="34" charset="0"/>
               </a:rPr>
-              <a:t>You will now practice the task for a few trials.</a:t>
+              <a:t>Occasionally, you will be asked about how confident you are on which is the majority colour.</a:t>
             </a:r>
           </a:p>
         </p:txBody>
@@ -8363,7 +8363,7 @@
         <p:spPr>
           <a:xfrm>
             <a:off x="1833902" y="5877272"/>
-            <a:ext cx="5476179" cy="523220"/>
+            <a:ext cx="5137368" cy="523220"/>
           </a:xfrm>
           <a:prstGeom prst="rect">
             <a:avLst/>
@@ -8387,7 +8387,7 @@
                 <a:latin typeface="Arial" panose="020B0604020202020204" pitchFamily="34" charset="0"/>
                 <a:cs typeface="Arial" panose="020B0604020202020204" pitchFamily="34" charset="0"/>
               </a:rPr>
-              <a:t>[Click to start the Practice Phase]</a:t>
+              <a:t>[Click to start the Practice Trial]</a:t>
             </a:r>
           </a:p>
         </p:txBody>

</xml_diff>

<commit_message>
Fixed instructions for eeg test 1
</commit_message>
<xml_diff>
--- a/Instructions/instructions_adapted.pptx
+++ b/Instructions/instructions_adapted.pptx
@@ -226,7 +226,7 @@
           <a:p>
             <a:fld id="{2C27CEE3-7CDA-4780-9F85-765E50CB07F7}" type="datetimeFigureOut">
               <a:rPr lang="en-GB" smtClean="0"/>
-              <a:t>10/11/2021</a:t>
+              <a:t>11/11/2021</a:t>
             </a:fld>
             <a:endParaRPr lang="en-GB"/>
           </a:p>
@@ -675,7 +675,7 @@
           <a:p>
             <a:fld id="{0F3A0F3E-9580-46AF-A1DB-5E4659722DCF}" type="datetimeFigureOut">
               <a:rPr lang="en-GB" smtClean="0"/>
-              <a:t>10/11/2021</a:t>
+              <a:t>11/11/2021</a:t>
             </a:fld>
             <a:endParaRPr lang="en-GB"/>
           </a:p>
@@ -845,7 +845,7 @@
           <a:p>
             <a:fld id="{0F3A0F3E-9580-46AF-A1DB-5E4659722DCF}" type="datetimeFigureOut">
               <a:rPr lang="en-GB" smtClean="0"/>
-              <a:t>10/11/2021</a:t>
+              <a:t>11/11/2021</a:t>
             </a:fld>
             <a:endParaRPr lang="en-GB"/>
           </a:p>
@@ -1025,7 +1025,7 @@
           <a:p>
             <a:fld id="{0F3A0F3E-9580-46AF-A1DB-5E4659722DCF}" type="datetimeFigureOut">
               <a:rPr lang="en-GB" smtClean="0"/>
-              <a:t>10/11/2021</a:t>
+              <a:t>11/11/2021</a:t>
             </a:fld>
             <a:endParaRPr lang="en-GB"/>
           </a:p>
@@ -1195,7 +1195,7 @@
           <a:p>
             <a:fld id="{0F3A0F3E-9580-46AF-A1DB-5E4659722DCF}" type="datetimeFigureOut">
               <a:rPr lang="en-GB" smtClean="0"/>
-              <a:t>10/11/2021</a:t>
+              <a:t>11/11/2021</a:t>
             </a:fld>
             <a:endParaRPr lang="en-GB"/>
           </a:p>
@@ -1441,7 +1441,7 @@
           <a:p>
             <a:fld id="{0F3A0F3E-9580-46AF-A1DB-5E4659722DCF}" type="datetimeFigureOut">
               <a:rPr lang="en-GB" smtClean="0"/>
-              <a:t>10/11/2021</a:t>
+              <a:t>11/11/2021</a:t>
             </a:fld>
             <a:endParaRPr lang="en-GB"/>
           </a:p>
@@ -1729,7 +1729,7 @@
           <a:p>
             <a:fld id="{0F3A0F3E-9580-46AF-A1DB-5E4659722DCF}" type="datetimeFigureOut">
               <a:rPr lang="en-GB" smtClean="0"/>
-              <a:t>10/11/2021</a:t>
+              <a:t>11/11/2021</a:t>
             </a:fld>
             <a:endParaRPr lang="en-GB"/>
           </a:p>
@@ -2151,7 +2151,7 @@
           <a:p>
             <a:fld id="{0F3A0F3E-9580-46AF-A1DB-5E4659722DCF}" type="datetimeFigureOut">
               <a:rPr lang="en-GB" smtClean="0"/>
-              <a:t>10/11/2021</a:t>
+              <a:t>11/11/2021</a:t>
             </a:fld>
             <a:endParaRPr lang="en-GB"/>
           </a:p>
@@ -2269,7 +2269,7 @@
           <a:p>
             <a:fld id="{0F3A0F3E-9580-46AF-A1DB-5E4659722DCF}" type="datetimeFigureOut">
               <a:rPr lang="en-GB" smtClean="0"/>
-              <a:t>10/11/2021</a:t>
+              <a:t>11/11/2021</a:t>
             </a:fld>
             <a:endParaRPr lang="en-GB"/>
           </a:p>
@@ -2364,7 +2364,7 @@
           <a:p>
             <a:fld id="{0F3A0F3E-9580-46AF-A1DB-5E4659722DCF}" type="datetimeFigureOut">
               <a:rPr lang="en-GB" smtClean="0"/>
-              <a:t>10/11/2021</a:t>
+              <a:t>11/11/2021</a:t>
             </a:fld>
             <a:endParaRPr lang="en-GB"/>
           </a:p>
@@ -2641,7 +2641,7 @@
           <a:p>
             <a:fld id="{0F3A0F3E-9580-46AF-A1DB-5E4659722DCF}" type="datetimeFigureOut">
               <a:rPr lang="en-GB" smtClean="0"/>
-              <a:t>10/11/2021</a:t>
+              <a:t>11/11/2021</a:t>
             </a:fld>
             <a:endParaRPr lang="en-GB"/>
           </a:p>
@@ -2894,7 +2894,7 @@
           <a:p>
             <a:fld id="{0F3A0F3E-9580-46AF-A1DB-5E4659722DCF}" type="datetimeFigureOut">
               <a:rPr lang="en-GB" smtClean="0"/>
-              <a:t>10/11/2021</a:t>
+              <a:t>11/11/2021</a:t>
             </a:fld>
             <a:endParaRPr lang="en-GB"/>
           </a:p>
@@ -3113,7 +3113,7 @@
           <a:p>
             <a:fld id="{0F3A0F3E-9580-46AF-A1DB-5E4659722DCF}" type="datetimeFigureOut">
               <a:rPr lang="en-GB" smtClean="0"/>
-              <a:t>10/11/2021</a:t>
+              <a:t>11/11/2021</a:t>
             </a:fld>
             <a:endParaRPr lang="en-GB"/>
           </a:p>
@@ -3548,44 +3548,6 @@
       </p:sp>
       <p:sp>
         <p:nvSpPr>
-          <p:cNvPr id="4" name="TextBox 3"/>
-          <p:cNvSpPr txBox="1"/>
-          <p:nvPr/>
-        </p:nvSpPr>
-        <p:spPr>
-          <a:xfrm>
-            <a:off x="3062685" y="6145720"/>
-            <a:ext cx="3102131" cy="523220"/>
-          </a:xfrm>
-          <a:prstGeom prst="rect">
-            <a:avLst/>
-          </a:prstGeom>
-          <a:noFill/>
-        </p:spPr>
-        <p:txBody>
-          <a:bodyPr wrap="none" rtlCol="0">
-            <a:spAutoFit/>
-          </a:bodyPr>
-          <a:lstStyle/>
-          <a:p>
-            <a:r>
-              <a:rPr lang="en-GB" sz="2800" dirty="0">
-                <a:solidFill>
-                  <a:schemeClr val="bg1">
-                    <a:lumMod val="95000"/>
-                    <a:lumOff val="5000"/>
-                  </a:schemeClr>
-                </a:solidFill>
-                <a:latin typeface="Arial" panose="020B0604020202020204" pitchFamily="34" charset="0"/>
-                <a:cs typeface="Arial" panose="020B0604020202020204" pitchFamily="34" charset="0"/>
-              </a:rPr>
-              <a:t>[Click to Continue]</a:t>
-            </a:r>
-          </a:p>
-        </p:txBody>
-      </p:sp>
-      <p:sp>
-        <p:nvSpPr>
           <p:cNvPr id="5" name="TextBox 4"/>
           <p:cNvSpPr txBox="1"/>
           <p:nvPr/>
@@ -4247,6 +4209,109 @@
           </a:p>
         </p:txBody>
       </p:sp>
+      <p:grpSp>
+        <p:nvGrpSpPr>
+          <p:cNvPr id="7" name="Group 6">
+            <a:extLst>
+              <a:ext uri="{FF2B5EF4-FFF2-40B4-BE49-F238E27FC236}">
+                <a16:creationId xmlns:a16="http://schemas.microsoft.com/office/drawing/2014/main" id="{94936CE8-3983-4B9E-817D-33B9F35FE63E}"/>
+              </a:ext>
+            </a:extLst>
+          </p:cNvPr>
+          <p:cNvGrpSpPr/>
+          <p:nvPr/>
+        </p:nvGrpSpPr>
+        <p:grpSpPr>
+          <a:xfrm>
+            <a:off x="262437" y="6237284"/>
+            <a:ext cx="8702628" cy="523220"/>
+            <a:chOff x="240646" y="6105381"/>
+            <a:chExt cx="8702628" cy="523220"/>
+          </a:xfrm>
+        </p:grpSpPr>
+        <p:sp>
+          <p:nvSpPr>
+            <p:cNvPr id="4" name="TextBox 3"/>
+            <p:cNvSpPr txBox="1"/>
+            <p:nvPr/>
+          </p:nvSpPr>
+          <p:spPr>
+            <a:xfrm>
+              <a:off x="4901783" y="6105381"/>
+              <a:ext cx="4041491" cy="523220"/>
+            </a:xfrm>
+            <a:prstGeom prst="rect">
+              <a:avLst/>
+            </a:prstGeom>
+            <a:noFill/>
+          </p:spPr>
+          <p:txBody>
+            <a:bodyPr wrap="none" rtlCol="0">
+              <a:spAutoFit/>
+            </a:bodyPr>
+            <a:lstStyle/>
+            <a:p>
+              <a:r>
+                <a:rPr lang="en-GB" sz="2800" dirty="0">
+                  <a:solidFill>
+                    <a:schemeClr val="bg1">
+                      <a:lumMod val="95000"/>
+                      <a:lumOff val="5000"/>
+                    </a:schemeClr>
+                  </a:solidFill>
+                  <a:latin typeface="Arial" panose="020B0604020202020204" pitchFamily="34" charset="0"/>
+                  <a:cs typeface="Arial" panose="020B0604020202020204" pitchFamily="34" charset="0"/>
+                </a:rPr>
+                <a:t>[Right Click to Continue]</a:t>
+              </a:r>
+            </a:p>
+          </p:txBody>
+        </p:sp>
+        <p:sp>
+          <p:nvSpPr>
+            <p:cNvPr id="13" name="TextBox 12">
+              <a:extLst>
+                <a:ext uri="{FF2B5EF4-FFF2-40B4-BE49-F238E27FC236}">
+                  <a16:creationId xmlns:a16="http://schemas.microsoft.com/office/drawing/2014/main" id="{506B70FD-C91C-4DEF-982B-6D30CB76DE59}"/>
+                </a:ext>
+              </a:extLst>
+            </p:cNvPr>
+            <p:cNvSpPr txBox="1"/>
+            <p:nvPr/>
+          </p:nvSpPr>
+          <p:spPr>
+            <a:xfrm>
+              <a:off x="240646" y="6105381"/>
+              <a:ext cx="3736920" cy="523220"/>
+            </a:xfrm>
+            <a:prstGeom prst="rect">
+              <a:avLst/>
+            </a:prstGeom>
+            <a:noFill/>
+          </p:spPr>
+          <p:txBody>
+            <a:bodyPr wrap="none" rtlCol="0">
+              <a:spAutoFit/>
+            </a:bodyPr>
+            <a:lstStyle/>
+            <a:p>
+              <a:r>
+                <a:rPr lang="en-GB" sz="2800" dirty="0">
+                  <a:solidFill>
+                    <a:schemeClr val="bg1">
+                      <a:lumMod val="95000"/>
+                      <a:lumOff val="5000"/>
+                    </a:schemeClr>
+                  </a:solidFill>
+                  <a:latin typeface="Arial" panose="020B0604020202020204" pitchFamily="34" charset="0"/>
+                  <a:cs typeface="Arial" panose="020B0604020202020204" pitchFamily="34" charset="0"/>
+                </a:rPr>
+                <a:t>[Left Click to Go Back]</a:t>
+              </a:r>
+            </a:p>
+          </p:txBody>
+        </p:sp>
+      </p:grpSp>
     </p:spTree>
     <p:extLst>
       <p:ext uri="{BB962C8B-B14F-4D97-AF65-F5344CB8AC3E}">
@@ -4924,50 +4989,6 @@
           <a:p>
             <a:pPr algn="ctr"/>
             <a:endParaRPr lang="en-US"/>
-          </a:p>
-        </p:txBody>
-      </p:sp>
-      <p:sp>
-        <p:nvSpPr>
-          <p:cNvPr id="20" name="TextBox 19">
-            <a:extLst>
-              <a:ext uri="{FF2B5EF4-FFF2-40B4-BE49-F238E27FC236}">
-                <a16:creationId xmlns:a16="http://schemas.microsoft.com/office/drawing/2014/main" id="{F4122FDB-91C9-EC4C-9643-8DF159990667}"/>
-              </a:ext>
-            </a:extLst>
-          </p:cNvPr>
-          <p:cNvSpPr txBox="1"/>
-          <p:nvPr/>
-        </p:nvSpPr>
-        <p:spPr>
-          <a:xfrm>
-            <a:off x="3062686" y="6213220"/>
-            <a:ext cx="3102131" cy="523220"/>
-          </a:xfrm>
-          <a:prstGeom prst="rect">
-            <a:avLst/>
-          </a:prstGeom>
-          <a:noFill/>
-        </p:spPr>
-        <p:txBody>
-          <a:bodyPr wrap="none" rtlCol="0">
-            <a:spAutoFit/>
-          </a:bodyPr>
-          <a:lstStyle/>
-          <a:p>
-            <a:r>
-              <a:rPr lang="en-GB" sz="2800" dirty="0">
-                <a:solidFill>
-                  <a:schemeClr val="bg1">
-                    <a:lumMod val="95000"/>
-                    <a:lumOff val="5000"/>
-                  </a:schemeClr>
-                </a:solidFill>
-                <a:latin typeface="Arial" panose="020B0604020202020204" pitchFamily="34" charset="0"/>
-                <a:cs typeface="Arial" panose="020B0604020202020204" pitchFamily="34" charset="0"/>
-              </a:rPr>
-              <a:t>[Click to Continue]</a:t>
-            </a:r>
           </a:p>
         </p:txBody>
       </p:sp>
@@ -5433,6 +5454,115 @@
           </p:txBody>
         </p:sp>
       </p:grpSp>
+      <p:grpSp>
+        <p:nvGrpSpPr>
+          <p:cNvPr id="24" name="Group 23">
+            <a:extLst>
+              <a:ext uri="{FF2B5EF4-FFF2-40B4-BE49-F238E27FC236}">
+                <a16:creationId xmlns:a16="http://schemas.microsoft.com/office/drawing/2014/main" id="{391A3438-0538-4813-9A13-759599C34CC1}"/>
+              </a:ext>
+            </a:extLst>
+          </p:cNvPr>
+          <p:cNvGrpSpPr/>
+          <p:nvPr/>
+        </p:nvGrpSpPr>
+        <p:grpSpPr>
+          <a:xfrm>
+            <a:off x="269442" y="6225785"/>
+            <a:ext cx="8702628" cy="523220"/>
+            <a:chOff x="240646" y="6105381"/>
+            <a:chExt cx="8702628" cy="523220"/>
+          </a:xfrm>
+        </p:grpSpPr>
+        <p:sp>
+          <p:nvSpPr>
+            <p:cNvPr id="25" name="TextBox 24">
+              <a:extLst>
+                <a:ext uri="{FF2B5EF4-FFF2-40B4-BE49-F238E27FC236}">
+                  <a16:creationId xmlns:a16="http://schemas.microsoft.com/office/drawing/2014/main" id="{116EC792-4978-47E7-8A7C-617307E6B1AA}"/>
+                </a:ext>
+              </a:extLst>
+            </p:cNvPr>
+            <p:cNvSpPr txBox="1"/>
+            <p:nvPr/>
+          </p:nvSpPr>
+          <p:spPr>
+            <a:xfrm>
+              <a:off x="4901783" y="6105381"/>
+              <a:ext cx="4041491" cy="523220"/>
+            </a:xfrm>
+            <a:prstGeom prst="rect">
+              <a:avLst/>
+            </a:prstGeom>
+            <a:noFill/>
+          </p:spPr>
+          <p:txBody>
+            <a:bodyPr wrap="none" rtlCol="0">
+              <a:spAutoFit/>
+            </a:bodyPr>
+            <a:lstStyle/>
+            <a:p>
+              <a:r>
+                <a:rPr lang="en-GB" sz="2800" dirty="0">
+                  <a:solidFill>
+                    <a:schemeClr val="bg1">
+                      <a:lumMod val="95000"/>
+                      <a:lumOff val="5000"/>
+                    </a:schemeClr>
+                  </a:solidFill>
+                  <a:latin typeface="Arial" panose="020B0604020202020204" pitchFamily="34" charset="0"/>
+                  <a:cs typeface="Arial" panose="020B0604020202020204" pitchFamily="34" charset="0"/>
+                </a:rPr>
+                <a:t>[Right Click to Continue]</a:t>
+              </a:r>
+            </a:p>
+          </p:txBody>
+        </p:sp>
+        <p:sp>
+          <p:nvSpPr>
+            <p:cNvPr id="26" name="TextBox 25">
+              <a:extLst>
+                <a:ext uri="{FF2B5EF4-FFF2-40B4-BE49-F238E27FC236}">
+                  <a16:creationId xmlns:a16="http://schemas.microsoft.com/office/drawing/2014/main" id="{E993BD0C-F9DD-416C-93EF-8D87C430251E}"/>
+                </a:ext>
+              </a:extLst>
+            </p:cNvPr>
+            <p:cNvSpPr txBox="1"/>
+            <p:nvPr/>
+          </p:nvSpPr>
+          <p:spPr>
+            <a:xfrm>
+              <a:off x="240646" y="6105381"/>
+              <a:ext cx="3736920" cy="523220"/>
+            </a:xfrm>
+            <a:prstGeom prst="rect">
+              <a:avLst/>
+            </a:prstGeom>
+            <a:noFill/>
+          </p:spPr>
+          <p:txBody>
+            <a:bodyPr wrap="none" rtlCol="0">
+              <a:spAutoFit/>
+            </a:bodyPr>
+            <a:lstStyle/>
+            <a:p>
+              <a:r>
+                <a:rPr lang="en-GB" sz="2800" dirty="0">
+                  <a:solidFill>
+                    <a:schemeClr val="bg1">
+                      <a:lumMod val="95000"/>
+                      <a:lumOff val="5000"/>
+                    </a:schemeClr>
+                  </a:solidFill>
+                  <a:latin typeface="Arial" panose="020B0604020202020204" pitchFamily="34" charset="0"/>
+                  <a:cs typeface="Arial" panose="020B0604020202020204" pitchFamily="34" charset="0"/>
+                </a:rPr>
+                <a:t>[Left Click to Go Back]</a:t>
+              </a:r>
+            </a:p>
+          </p:txBody>
+        </p:sp>
+      </p:grpSp>
     </p:spTree>
     <p:extLst>
       <p:ext uri="{BB962C8B-B14F-4D97-AF65-F5344CB8AC3E}">
@@ -6112,50 +6242,6 @@
       </p:sp>
       <p:sp>
         <p:nvSpPr>
-          <p:cNvPr id="20" name="TextBox 19">
-            <a:extLst>
-              <a:ext uri="{FF2B5EF4-FFF2-40B4-BE49-F238E27FC236}">
-                <a16:creationId xmlns:a16="http://schemas.microsoft.com/office/drawing/2014/main" id="{F4122FDB-91C9-EC4C-9643-8DF159990667}"/>
-              </a:ext>
-            </a:extLst>
-          </p:cNvPr>
-          <p:cNvSpPr txBox="1"/>
-          <p:nvPr/>
-        </p:nvSpPr>
-        <p:spPr>
-          <a:xfrm>
-            <a:off x="3062686" y="6213220"/>
-            <a:ext cx="3102131" cy="523220"/>
-          </a:xfrm>
-          <a:prstGeom prst="rect">
-            <a:avLst/>
-          </a:prstGeom>
-          <a:noFill/>
-        </p:spPr>
-        <p:txBody>
-          <a:bodyPr wrap="none" rtlCol="0">
-            <a:spAutoFit/>
-          </a:bodyPr>
-          <a:lstStyle/>
-          <a:p>
-            <a:r>
-              <a:rPr lang="en-GB" sz="2800" dirty="0">
-                <a:solidFill>
-                  <a:schemeClr val="bg1">
-                    <a:lumMod val="95000"/>
-                    <a:lumOff val="5000"/>
-                  </a:schemeClr>
-                </a:solidFill>
-                <a:latin typeface="Arial" panose="020B0604020202020204" pitchFamily="34" charset="0"/>
-                <a:cs typeface="Arial" panose="020B0604020202020204" pitchFamily="34" charset="0"/>
-              </a:rPr>
-              <a:t>[Click to Continue]</a:t>
-            </a:r>
-          </a:p>
-        </p:txBody>
-      </p:sp>
-      <p:sp>
-        <p:nvSpPr>
           <p:cNvPr id="14" name="Rectangle 13">
             <a:extLst>
               <a:ext uri="{FF2B5EF4-FFF2-40B4-BE49-F238E27FC236}">
@@ -6635,6 +6721,115 @@
           </a:p>
         </p:txBody>
       </p:sp>
+      <p:grpSp>
+        <p:nvGrpSpPr>
+          <p:cNvPr id="27" name="Group 26">
+            <a:extLst>
+              <a:ext uri="{FF2B5EF4-FFF2-40B4-BE49-F238E27FC236}">
+                <a16:creationId xmlns:a16="http://schemas.microsoft.com/office/drawing/2014/main" id="{00A99EE7-0C00-4CD9-B5BA-BDABB372C608}"/>
+              </a:ext>
+            </a:extLst>
+          </p:cNvPr>
+          <p:cNvGrpSpPr/>
+          <p:nvPr/>
+        </p:nvGrpSpPr>
+        <p:grpSpPr>
+          <a:xfrm>
+            <a:off x="262437" y="6220559"/>
+            <a:ext cx="8702628" cy="523220"/>
+            <a:chOff x="240646" y="6105381"/>
+            <a:chExt cx="8702628" cy="523220"/>
+          </a:xfrm>
+        </p:grpSpPr>
+        <p:sp>
+          <p:nvSpPr>
+            <p:cNvPr id="28" name="TextBox 27">
+              <a:extLst>
+                <a:ext uri="{FF2B5EF4-FFF2-40B4-BE49-F238E27FC236}">
+                  <a16:creationId xmlns:a16="http://schemas.microsoft.com/office/drawing/2014/main" id="{238E0AF5-89D8-4A73-8E77-01D2DFF0FA97}"/>
+                </a:ext>
+              </a:extLst>
+            </p:cNvPr>
+            <p:cNvSpPr txBox="1"/>
+            <p:nvPr/>
+          </p:nvSpPr>
+          <p:spPr>
+            <a:xfrm>
+              <a:off x="4901783" y="6105381"/>
+              <a:ext cx="4041491" cy="523220"/>
+            </a:xfrm>
+            <a:prstGeom prst="rect">
+              <a:avLst/>
+            </a:prstGeom>
+            <a:noFill/>
+          </p:spPr>
+          <p:txBody>
+            <a:bodyPr wrap="none" rtlCol="0">
+              <a:spAutoFit/>
+            </a:bodyPr>
+            <a:lstStyle/>
+            <a:p>
+              <a:r>
+                <a:rPr lang="en-GB" sz="2800" dirty="0">
+                  <a:solidFill>
+                    <a:schemeClr val="bg1">
+                      <a:lumMod val="95000"/>
+                      <a:lumOff val="5000"/>
+                    </a:schemeClr>
+                  </a:solidFill>
+                  <a:latin typeface="Arial" panose="020B0604020202020204" pitchFamily="34" charset="0"/>
+                  <a:cs typeface="Arial" panose="020B0604020202020204" pitchFamily="34" charset="0"/>
+                </a:rPr>
+                <a:t>[Right Click to Continue]</a:t>
+              </a:r>
+            </a:p>
+          </p:txBody>
+        </p:sp>
+        <p:sp>
+          <p:nvSpPr>
+            <p:cNvPr id="29" name="TextBox 28">
+              <a:extLst>
+                <a:ext uri="{FF2B5EF4-FFF2-40B4-BE49-F238E27FC236}">
+                  <a16:creationId xmlns:a16="http://schemas.microsoft.com/office/drawing/2014/main" id="{46A3561F-D28B-4785-AC13-06DCE02637A8}"/>
+                </a:ext>
+              </a:extLst>
+            </p:cNvPr>
+            <p:cNvSpPr txBox="1"/>
+            <p:nvPr/>
+          </p:nvSpPr>
+          <p:spPr>
+            <a:xfrm>
+              <a:off x="240646" y="6105381"/>
+              <a:ext cx="3736920" cy="523220"/>
+            </a:xfrm>
+            <a:prstGeom prst="rect">
+              <a:avLst/>
+            </a:prstGeom>
+            <a:noFill/>
+          </p:spPr>
+          <p:txBody>
+            <a:bodyPr wrap="none" rtlCol="0">
+              <a:spAutoFit/>
+            </a:bodyPr>
+            <a:lstStyle/>
+            <a:p>
+              <a:r>
+                <a:rPr lang="en-GB" sz="2800" dirty="0">
+                  <a:solidFill>
+                    <a:schemeClr val="bg1">
+                      <a:lumMod val="95000"/>
+                      <a:lumOff val="5000"/>
+                    </a:schemeClr>
+                  </a:solidFill>
+                  <a:latin typeface="Arial" panose="020B0604020202020204" pitchFamily="34" charset="0"/>
+                  <a:cs typeface="Arial" panose="020B0604020202020204" pitchFamily="34" charset="0"/>
+                </a:rPr>
+                <a:t>[Left Click to Go Back]</a:t>
+              </a:r>
+            </a:p>
+          </p:txBody>
+        </p:sp>
+      </p:grpSp>
     </p:spTree>
     <p:extLst>
       <p:ext uri="{BB962C8B-B14F-4D97-AF65-F5344CB8AC3E}">
@@ -7314,50 +7509,6 @@
       </p:sp>
       <p:sp>
         <p:nvSpPr>
-          <p:cNvPr id="20" name="TextBox 19">
-            <a:extLst>
-              <a:ext uri="{FF2B5EF4-FFF2-40B4-BE49-F238E27FC236}">
-                <a16:creationId xmlns:a16="http://schemas.microsoft.com/office/drawing/2014/main" id="{F4122FDB-91C9-EC4C-9643-8DF159990667}"/>
-              </a:ext>
-            </a:extLst>
-          </p:cNvPr>
-          <p:cNvSpPr txBox="1"/>
-          <p:nvPr/>
-        </p:nvSpPr>
-        <p:spPr>
-          <a:xfrm>
-            <a:off x="3062686" y="6213220"/>
-            <a:ext cx="3102131" cy="523220"/>
-          </a:xfrm>
-          <a:prstGeom prst="rect">
-            <a:avLst/>
-          </a:prstGeom>
-          <a:noFill/>
-        </p:spPr>
-        <p:txBody>
-          <a:bodyPr wrap="none" rtlCol="0">
-            <a:spAutoFit/>
-          </a:bodyPr>
-          <a:lstStyle/>
-          <a:p>
-            <a:r>
-              <a:rPr lang="en-GB" sz="2800" dirty="0">
-                <a:solidFill>
-                  <a:schemeClr val="bg1">
-                    <a:lumMod val="95000"/>
-                    <a:lumOff val="5000"/>
-                  </a:schemeClr>
-                </a:solidFill>
-                <a:latin typeface="Arial" panose="020B0604020202020204" pitchFamily="34" charset="0"/>
-                <a:cs typeface="Arial" panose="020B0604020202020204" pitchFamily="34" charset="0"/>
-              </a:rPr>
-              <a:t>[Click to Continue]</a:t>
-            </a:r>
-          </a:p>
-        </p:txBody>
-      </p:sp>
-      <p:sp>
-        <p:nvSpPr>
           <p:cNvPr id="14" name="Rectangle 13">
             <a:extLst>
               <a:ext uri="{FF2B5EF4-FFF2-40B4-BE49-F238E27FC236}">
@@ -7837,6 +7988,115 @@
           </a:p>
         </p:txBody>
       </p:sp>
+      <p:grpSp>
+        <p:nvGrpSpPr>
+          <p:cNvPr id="27" name="Group 26">
+            <a:extLst>
+              <a:ext uri="{FF2B5EF4-FFF2-40B4-BE49-F238E27FC236}">
+                <a16:creationId xmlns:a16="http://schemas.microsoft.com/office/drawing/2014/main" id="{AC69855C-09BA-421A-B776-44661A2FD1AD}"/>
+              </a:ext>
+            </a:extLst>
+          </p:cNvPr>
+          <p:cNvGrpSpPr/>
+          <p:nvPr/>
+        </p:nvGrpSpPr>
+        <p:grpSpPr>
+          <a:xfrm>
+            <a:off x="220686" y="6211592"/>
+            <a:ext cx="8702628" cy="523220"/>
+            <a:chOff x="240646" y="6105381"/>
+            <a:chExt cx="8702628" cy="523220"/>
+          </a:xfrm>
+        </p:grpSpPr>
+        <p:sp>
+          <p:nvSpPr>
+            <p:cNvPr id="28" name="TextBox 27">
+              <a:extLst>
+                <a:ext uri="{FF2B5EF4-FFF2-40B4-BE49-F238E27FC236}">
+                  <a16:creationId xmlns:a16="http://schemas.microsoft.com/office/drawing/2014/main" id="{AC76071E-0146-48D8-A0C7-80E02025CAE6}"/>
+                </a:ext>
+              </a:extLst>
+            </p:cNvPr>
+            <p:cNvSpPr txBox="1"/>
+            <p:nvPr/>
+          </p:nvSpPr>
+          <p:spPr>
+            <a:xfrm>
+              <a:off x="4901783" y="6105381"/>
+              <a:ext cx="4041491" cy="523220"/>
+            </a:xfrm>
+            <a:prstGeom prst="rect">
+              <a:avLst/>
+            </a:prstGeom>
+            <a:noFill/>
+          </p:spPr>
+          <p:txBody>
+            <a:bodyPr wrap="none" rtlCol="0">
+              <a:spAutoFit/>
+            </a:bodyPr>
+            <a:lstStyle/>
+            <a:p>
+              <a:r>
+                <a:rPr lang="en-GB" sz="2800" dirty="0">
+                  <a:solidFill>
+                    <a:schemeClr val="bg1">
+                      <a:lumMod val="95000"/>
+                      <a:lumOff val="5000"/>
+                    </a:schemeClr>
+                  </a:solidFill>
+                  <a:latin typeface="Arial" panose="020B0604020202020204" pitchFamily="34" charset="0"/>
+                  <a:cs typeface="Arial" panose="020B0604020202020204" pitchFamily="34" charset="0"/>
+                </a:rPr>
+                <a:t>[Right Click to Continue]</a:t>
+              </a:r>
+            </a:p>
+          </p:txBody>
+        </p:sp>
+        <p:sp>
+          <p:nvSpPr>
+            <p:cNvPr id="29" name="TextBox 28">
+              <a:extLst>
+                <a:ext uri="{FF2B5EF4-FFF2-40B4-BE49-F238E27FC236}">
+                  <a16:creationId xmlns:a16="http://schemas.microsoft.com/office/drawing/2014/main" id="{4C5A858F-4E06-4A95-92F7-8450270D870D}"/>
+                </a:ext>
+              </a:extLst>
+            </p:cNvPr>
+            <p:cNvSpPr txBox="1"/>
+            <p:nvPr/>
+          </p:nvSpPr>
+          <p:spPr>
+            <a:xfrm>
+              <a:off x="240646" y="6105381"/>
+              <a:ext cx="3736920" cy="523220"/>
+            </a:xfrm>
+            <a:prstGeom prst="rect">
+              <a:avLst/>
+            </a:prstGeom>
+            <a:noFill/>
+          </p:spPr>
+          <p:txBody>
+            <a:bodyPr wrap="none" rtlCol="0">
+              <a:spAutoFit/>
+            </a:bodyPr>
+            <a:lstStyle/>
+            <a:p>
+              <a:r>
+                <a:rPr lang="en-GB" sz="2800" dirty="0">
+                  <a:solidFill>
+                    <a:schemeClr val="bg1">
+                      <a:lumMod val="95000"/>
+                      <a:lumOff val="5000"/>
+                    </a:schemeClr>
+                  </a:solidFill>
+                  <a:latin typeface="Arial" panose="020B0604020202020204" pitchFamily="34" charset="0"/>
+                  <a:cs typeface="Arial" panose="020B0604020202020204" pitchFamily="34" charset="0"/>
+                </a:rPr>
+                <a:t>[Left Click to Go Back]</a:t>
+              </a:r>
+            </a:p>
+          </p:txBody>
+        </p:sp>
+      </p:grpSp>
     </p:spTree>
     <p:extLst>
       <p:ext uri="{BB962C8B-B14F-4D97-AF65-F5344CB8AC3E}">
@@ -7950,7 +8210,7 @@
         <p:spPr>
           <a:xfrm>
             <a:off x="1833904" y="5129004"/>
-            <a:ext cx="5137368" cy="523220"/>
+            <a:ext cx="5836278" cy="523220"/>
           </a:xfrm>
           <a:prstGeom prst="rect">
             <a:avLst/>
@@ -7974,7 +8234,7 @@
                 <a:latin typeface="Arial" panose="020B0604020202020204" pitchFamily="34" charset="0"/>
                 <a:cs typeface="Arial" panose="020B0604020202020204" pitchFamily="34" charset="0"/>
               </a:rPr>
-              <a:t>[Click to start the Practice Trial]</a:t>
+              <a:t>[Left Click to start the Practice Trial]</a:t>
             </a:r>
           </a:p>
         </p:txBody>
@@ -8078,8 +8338,8 @@
         </p:nvSpPr>
         <p:spPr>
           <a:xfrm>
-            <a:off x="1763688" y="5157192"/>
-            <a:ext cx="6282489" cy="523220"/>
+            <a:off x="1187624" y="5229200"/>
+            <a:ext cx="6981398" cy="523220"/>
           </a:xfrm>
           <a:prstGeom prst="rect">
             <a:avLst/>
@@ -8103,7 +8363,7 @@
                 <a:latin typeface="Arial" panose="020B0604020202020204" pitchFamily="34" charset="0"/>
                 <a:cs typeface="Arial" panose="020B0604020202020204" pitchFamily="34" charset="0"/>
               </a:rPr>
-              <a:t>[Click to continue when you are ready]</a:t>
+              <a:t>[Left Click to continue when you are ready]</a:t>
             </a:r>
           </a:p>
         </p:txBody>
@@ -8207,8 +8467,8 @@
         </p:nvSpPr>
         <p:spPr>
           <a:xfrm>
-            <a:off x="1763688" y="5157192"/>
-            <a:ext cx="6282489" cy="523220"/>
+            <a:off x="1187624" y="5157192"/>
+            <a:ext cx="6981398" cy="523220"/>
           </a:xfrm>
           <a:prstGeom prst="rect">
             <a:avLst/>
@@ -8232,7 +8492,7 @@
                 <a:latin typeface="Arial" panose="020B0604020202020204" pitchFamily="34" charset="0"/>
                 <a:cs typeface="Arial" panose="020B0604020202020204" pitchFamily="34" charset="0"/>
               </a:rPr>
-              <a:t>[Click to continue when you are ready]</a:t>
+              <a:t>[Left Click to continue when you are ready]</a:t>
             </a:r>
           </a:p>
         </p:txBody>
@@ -8362,8 +8622,8 @@
         </p:nvSpPr>
         <p:spPr>
           <a:xfrm>
-            <a:off x="1833902" y="5877272"/>
-            <a:ext cx="5137368" cy="523220"/>
+            <a:off x="1653851" y="5877272"/>
+            <a:ext cx="5836278" cy="523220"/>
           </a:xfrm>
           <a:prstGeom prst="rect">
             <a:avLst/>
@@ -8387,7 +8647,7 @@
                 <a:latin typeface="Arial" panose="020B0604020202020204" pitchFamily="34" charset="0"/>
                 <a:cs typeface="Arial" panose="020B0604020202020204" pitchFamily="34" charset="0"/>
               </a:rPr>
-              <a:t>[Click to start the Practice Trial]</a:t>
+              <a:t>[Left Click to start the Practice Trial]</a:t>
             </a:r>
           </a:p>
         </p:txBody>
@@ -8699,8 +8959,8 @@
         </p:nvSpPr>
         <p:spPr>
           <a:xfrm>
-            <a:off x="3062686" y="6213220"/>
-            <a:ext cx="3102131" cy="523220"/>
+            <a:off x="2671478" y="6237312"/>
+            <a:ext cx="3801041" cy="523220"/>
           </a:xfrm>
           <a:prstGeom prst="rect">
             <a:avLst/>
@@ -8724,7 +8984,7 @@
                 <a:latin typeface="Arial" panose="020B0604020202020204" pitchFamily="34" charset="0"/>
                 <a:cs typeface="Arial" panose="020B0604020202020204" pitchFamily="34" charset="0"/>
               </a:rPr>
-              <a:t>[Click to Continue]</a:t>
+              <a:t>[Left Click to Continue]</a:t>
             </a:r>
           </a:p>
         </p:txBody>
@@ -9156,50 +9416,115 @@
           </a:prstGeom>
         </p:spPr>
       </p:pic>
-      <p:sp>
-        <p:nvSpPr>
-          <p:cNvPr id="16" name="TextBox 15">
+      <p:grpSp>
+        <p:nvGrpSpPr>
+          <p:cNvPr id="9" name="Group 8">
             <a:extLst>
               <a:ext uri="{FF2B5EF4-FFF2-40B4-BE49-F238E27FC236}">
-                <a16:creationId xmlns:a16="http://schemas.microsoft.com/office/drawing/2014/main" id="{E5FB1DCF-5436-4A4D-9DEB-1CE52B829568}"/>
+                <a16:creationId xmlns:a16="http://schemas.microsoft.com/office/drawing/2014/main" id="{CA00A832-DCA4-47B5-B330-B591042BBF05}"/>
               </a:ext>
             </a:extLst>
           </p:cNvPr>
-          <p:cNvSpPr txBox="1"/>
+          <p:cNvGrpSpPr/>
           <p:nvPr/>
-        </p:nvSpPr>
-        <p:spPr>
-          <a:xfrm>
-            <a:off x="3062686" y="6213220"/>
-            <a:ext cx="3102131" cy="523220"/>
-          </a:xfrm>
-          <a:prstGeom prst="rect">
-            <a:avLst/>
-          </a:prstGeom>
-          <a:noFill/>
-        </p:spPr>
-        <p:txBody>
-          <a:bodyPr wrap="none" rtlCol="0">
-            <a:spAutoFit/>
-          </a:bodyPr>
-          <a:lstStyle/>
-          <a:p>
-            <a:r>
-              <a:rPr lang="en-GB" sz="2800" dirty="0">
-                <a:solidFill>
-                  <a:schemeClr val="bg1">
-                    <a:lumMod val="95000"/>
-                    <a:lumOff val="5000"/>
-                  </a:schemeClr>
-                </a:solidFill>
-                <a:latin typeface="Arial" panose="020B0604020202020204" pitchFamily="34" charset="0"/>
-                <a:cs typeface="Arial" panose="020B0604020202020204" pitchFamily="34" charset="0"/>
-              </a:rPr>
-              <a:t>[Click to Continue]</a:t>
-            </a:r>
-          </a:p>
-        </p:txBody>
-      </p:sp>
+        </p:nvGrpSpPr>
+        <p:grpSpPr>
+          <a:xfrm>
+            <a:off x="220686" y="6213220"/>
+            <a:ext cx="8702628" cy="523220"/>
+            <a:chOff x="240646" y="6105381"/>
+            <a:chExt cx="8702628" cy="523220"/>
+          </a:xfrm>
+        </p:grpSpPr>
+        <p:sp>
+          <p:nvSpPr>
+            <p:cNvPr id="10" name="TextBox 9">
+              <a:extLst>
+                <a:ext uri="{FF2B5EF4-FFF2-40B4-BE49-F238E27FC236}">
+                  <a16:creationId xmlns:a16="http://schemas.microsoft.com/office/drawing/2014/main" id="{25ABC2B9-E987-4D9C-B8C1-BC02D482FCDB}"/>
+                </a:ext>
+              </a:extLst>
+            </p:cNvPr>
+            <p:cNvSpPr txBox="1"/>
+            <p:nvPr/>
+          </p:nvSpPr>
+          <p:spPr>
+            <a:xfrm>
+              <a:off x="4901783" y="6105381"/>
+              <a:ext cx="4041491" cy="523220"/>
+            </a:xfrm>
+            <a:prstGeom prst="rect">
+              <a:avLst/>
+            </a:prstGeom>
+            <a:noFill/>
+          </p:spPr>
+          <p:txBody>
+            <a:bodyPr wrap="none" rtlCol="0">
+              <a:spAutoFit/>
+            </a:bodyPr>
+            <a:lstStyle/>
+            <a:p>
+              <a:r>
+                <a:rPr lang="en-GB" sz="2800" dirty="0">
+                  <a:solidFill>
+                    <a:schemeClr val="bg1">
+                      <a:lumMod val="95000"/>
+                      <a:lumOff val="5000"/>
+                    </a:schemeClr>
+                  </a:solidFill>
+                  <a:latin typeface="Arial" panose="020B0604020202020204" pitchFamily="34" charset="0"/>
+                  <a:cs typeface="Arial" panose="020B0604020202020204" pitchFamily="34" charset="0"/>
+                </a:rPr>
+                <a:t>[Right Click to Continue]</a:t>
+              </a:r>
+            </a:p>
+          </p:txBody>
+        </p:sp>
+        <p:sp>
+          <p:nvSpPr>
+            <p:cNvPr id="11" name="TextBox 10">
+              <a:extLst>
+                <a:ext uri="{FF2B5EF4-FFF2-40B4-BE49-F238E27FC236}">
+                  <a16:creationId xmlns:a16="http://schemas.microsoft.com/office/drawing/2014/main" id="{4BACA537-DFEA-4D98-B000-4ED2C47481BB}"/>
+                </a:ext>
+              </a:extLst>
+            </p:cNvPr>
+            <p:cNvSpPr txBox="1"/>
+            <p:nvPr/>
+          </p:nvSpPr>
+          <p:spPr>
+            <a:xfrm>
+              <a:off x="240646" y="6105381"/>
+              <a:ext cx="3736920" cy="523220"/>
+            </a:xfrm>
+            <a:prstGeom prst="rect">
+              <a:avLst/>
+            </a:prstGeom>
+            <a:noFill/>
+          </p:spPr>
+          <p:txBody>
+            <a:bodyPr wrap="none" rtlCol="0">
+              <a:spAutoFit/>
+            </a:bodyPr>
+            <a:lstStyle/>
+            <a:p>
+              <a:r>
+                <a:rPr lang="en-GB" sz="2800" dirty="0">
+                  <a:solidFill>
+                    <a:schemeClr val="bg1">
+                      <a:lumMod val="95000"/>
+                      <a:lumOff val="5000"/>
+                    </a:schemeClr>
+                  </a:solidFill>
+                  <a:latin typeface="Arial" panose="020B0604020202020204" pitchFamily="34" charset="0"/>
+                  <a:cs typeface="Arial" panose="020B0604020202020204" pitchFamily="34" charset="0"/>
+                </a:rPr>
+                <a:t>[Left Click to Go Back]</a:t>
+              </a:r>
+            </a:p>
+          </p:txBody>
+        </p:sp>
+      </p:grpSp>
     </p:spTree>
     <p:extLst>
       <p:ext uri="{BB962C8B-B14F-4D97-AF65-F5344CB8AC3E}">
@@ -9607,50 +9932,115 @@
           </a:p>
         </p:txBody>
       </p:sp>
-      <p:sp>
-        <p:nvSpPr>
-          <p:cNvPr id="18" name="TextBox 17">
+      <p:grpSp>
+        <p:nvGrpSpPr>
+          <p:cNvPr id="11" name="Group 10">
             <a:extLst>
               <a:ext uri="{FF2B5EF4-FFF2-40B4-BE49-F238E27FC236}">
-                <a16:creationId xmlns:a16="http://schemas.microsoft.com/office/drawing/2014/main" id="{FD785F7F-58AD-344D-A4F3-969913E33546}"/>
+                <a16:creationId xmlns:a16="http://schemas.microsoft.com/office/drawing/2014/main" id="{FD306575-830D-492E-B726-845239B79D04}"/>
               </a:ext>
             </a:extLst>
           </p:cNvPr>
-          <p:cNvSpPr txBox="1"/>
+          <p:cNvGrpSpPr/>
           <p:nvPr/>
-        </p:nvSpPr>
-        <p:spPr>
-          <a:xfrm>
-            <a:off x="3062686" y="6213220"/>
-            <a:ext cx="3102131" cy="523220"/>
-          </a:xfrm>
-          <a:prstGeom prst="rect">
-            <a:avLst/>
-          </a:prstGeom>
-          <a:noFill/>
-        </p:spPr>
-        <p:txBody>
-          <a:bodyPr wrap="none" rtlCol="0">
-            <a:spAutoFit/>
-          </a:bodyPr>
-          <a:lstStyle/>
-          <a:p>
-            <a:r>
-              <a:rPr lang="en-GB" sz="2800" dirty="0">
-                <a:solidFill>
-                  <a:schemeClr val="bg1">
-                    <a:lumMod val="95000"/>
-                    <a:lumOff val="5000"/>
-                  </a:schemeClr>
-                </a:solidFill>
-                <a:latin typeface="Arial" panose="020B0604020202020204" pitchFamily="34" charset="0"/>
-                <a:cs typeface="Arial" panose="020B0604020202020204" pitchFamily="34" charset="0"/>
-              </a:rPr>
-              <a:t>[Click to Continue]</a:t>
-            </a:r>
-          </a:p>
-        </p:txBody>
-      </p:sp>
+        </p:nvGrpSpPr>
+        <p:grpSpPr>
+          <a:xfrm>
+            <a:off x="262437" y="6211871"/>
+            <a:ext cx="8702628" cy="523220"/>
+            <a:chOff x="240646" y="6105381"/>
+            <a:chExt cx="8702628" cy="523220"/>
+          </a:xfrm>
+        </p:grpSpPr>
+        <p:sp>
+          <p:nvSpPr>
+            <p:cNvPr id="12" name="TextBox 11">
+              <a:extLst>
+                <a:ext uri="{FF2B5EF4-FFF2-40B4-BE49-F238E27FC236}">
+                  <a16:creationId xmlns:a16="http://schemas.microsoft.com/office/drawing/2014/main" id="{41C3CA0F-7A44-4CEA-82FA-8913525200FC}"/>
+                </a:ext>
+              </a:extLst>
+            </p:cNvPr>
+            <p:cNvSpPr txBox="1"/>
+            <p:nvPr/>
+          </p:nvSpPr>
+          <p:spPr>
+            <a:xfrm>
+              <a:off x="4901783" y="6105381"/>
+              <a:ext cx="4041491" cy="523220"/>
+            </a:xfrm>
+            <a:prstGeom prst="rect">
+              <a:avLst/>
+            </a:prstGeom>
+            <a:noFill/>
+          </p:spPr>
+          <p:txBody>
+            <a:bodyPr wrap="none" rtlCol="0">
+              <a:spAutoFit/>
+            </a:bodyPr>
+            <a:lstStyle/>
+            <a:p>
+              <a:r>
+                <a:rPr lang="en-GB" sz="2800" dirty="0">
+                  <a:solidFill>
+                    <a:schemeClr val="bg1">
+                      <a:lumMod val="95000"/>
+                      <a:lumOff val="5000"/>
+                    </a:schemeClr>
+                  </a:solidFill>
+                  <a:latin typeface="Arial" panose="020B0604020202020204" pitchFamily="34" charset="0"/>
+                  <a:cs typeface="Arial" panose="020B0604020202020204" pitchFamily="34" charset="0"/>
+                </a:rPr>
+                <a:t>[Right Click to Continue]</a:t>
+              </a:r>
+            </a:p>
+          </p:txBody>
+        </p:sp>
+        <p:sp>
+          <p:nvSpPr>
+            <p:cNvPr id="13" name="TextBox 12">
+              <a:extLst>
+                <a:ext uri="{FF2B5EF4-FFF2-40B4-BE49-F238E27FC236}">
+                  <a16:creationId xmlns:a16="http://schemas.microsoft.com/office/drawing/2014/main" id="{86C4013A-C51F-4FA9-9FE0-4A9642264EA9}"/>
+                </a:ext>
+              </a:extLst>
+            </p:cNvPr>
+            <p:cNvSpPr txBox="1"/>
+            <p:nvPr/>
+          </p:nvSpPr>
+          <p:spPr>
+            <a:xfrm>
+              <a:off x="240646" y="6105381"/>
+              <a:ext cx="3736920" cy="523220"/>
+            </a:xfrm>
+            <a:prstGeom prst="rect">
+              <a:avLst/>
+            </a:prstGeom>
+            <a:noFill/>
+          </p:spPr>
+          <p:txBody>
+            <a:bodyPr wrap="none" rtlCol="0">
+              <a:spAutoFit/>
+            </a:bodyPr>
+            <a:lstStyle/>
+            <a:p>
+              <a:r>
+                <a:rPr lang="en-GB" sz="2800" dirty="0">
+                  <a:solidFill>
+                    <a:schemeClr val="bg1">
+                      <a:lumMod val="95000"/>
+                      <a:lumOff val="5000"/>
+                    </a:schemeClr>
+                  </a:solidFill>
+                  <a:latin typeface="Arial" panose="020B0604020202020204" pitchFamily="34" charset="0"/>
+                  <a:cs typeface="Arial" panose="020B0604020202020204" pitchFamily="34" charset="0"/>
+                </a:rPr>
+                <a:t>[Left Click to Go Back]</a:t>
+              </a:r>
+            </a:p>
+          </p:txBody>
+        </p:sp>
+      </p:grpSp>
     </p:spTree>
     <p:extLst>
       <p:ext uri="{BB962C8B-B14F-4D97-AF65-F5344CB8AC3E}">
@@ -10004,50 +10394,115 @@
           </a:p>
         </p:txBody>
       </p:sp>
-      <p:sp>
-        <p:nvSpPr>
-          <p:cNvPr id="7" name="TextBox 6">
+      <p:grpSp>
+        <p:nvGrpSpPr>
+          <p:cNvPr id="10" name="Group 9">
             <a:extLst>
               <a:ext uri="{FF2B5EF4-FFF2-40B4-BE49-F238E27FC236}">
-                <a16:creationId xmlns:a16="http://schemas.microsoft.com/office/drawing/2014/main" id="{E9C053D3-216C-F04E-BFCA-49CB168E8F28}"/>
+                <a16:creationId xmlns:a16="http://schemas.microsoft.com/office/drawing/2014/main" id="{17078235-5043-4E66-823A-0051C0BC589B}"/>
               </a:ext>
             </a:extLst>
           </p:cNvPr>
-          <p:cNvSpPr txBox="1"/>
+          <p:cNvGrpSpPr/>
           <p:nvPr/>
-        </p:nvSpPr>
-        <p:spPr>
-          <a:xfrm>
-            <a:off x="3062686" y="6213220"/>
-            <a:ext cx="3102131" cy="523220"/>
-          </a:xfrm>
-          <a:prstGeom prst="rect">
-            <a:avLst/>
-          </a:prstGeom>
-          <a:noFill/>
-        </p:spPr>
-        <p:txBody>
-          <a:bodyPr wrap="none" rtlCol="0">
-            <a:spAutoFit/>
-          </a:bodyPr>
-          <a:lstStyle/>
-          <a:p>
-            <a:r>
-              <a:rPr lang="en-GB" sz="2800" dirty="0">
-                <a:solidFill>
-                  <a:schemeClr val="bg1">
-                    <a:lumMod val="95000"/>
-                    <a:lumOff val="5000"/>
-                  </a:schemeClr>
-                </a:solidFill>
-                <a:latin typeface="Arial" panose="020B0604020202020204" pitchFamily="34" charset="0"/>
-                <a:cs typeface="Arial" panose="020B0604020202020204" pitchFamily="34" charset="0"/>
-              </a:rPr>
-              <a:t>[Click to Continue]</a:t>
-            </a:r>
-          </a:p>
-        </p:txBody>
-      </p:sp>
+        </p:nvGrpSpPr>
+        <p:grpSpPr>
+          <a:xfrm>
+            <a:off x="262437" y="6213220"/>
+            <a:ext cx="8702628" cy="523220"/>
+            <a:chOff x="240646" y="6105381"/>
+            <a:chExt cx="8702628" cy="523220"/>
+          </a:xfrm>
+        </p:grpSpPr>
+        <p:sp>
+          <p:nvSpPr>
+            <p:cNvPr id="11" name="TextBox 10">
+              <a:extLst>
+                <a:ext uri="{FF2B5EF4-FFF2-40B4-BE49-F238E27FC236}">
+                  <a16:creationId xmlns:a16="http://schemas.microsoft.com/office/drawing/2014/main" id="{5A225BF8-B53F-436C-949E-213A0F33C055}"/>
+                </a:ext>
+              </a:extLst>
+            </p:cNvPr>
+            <p:cNvSpPr txBox="1"/>
+            <p:nvPr/>
+          </p:nvSpPr>
+          <p:spPr>
+            <a:xfrm>
+              <a:off x="4901783" y="6105381"/>
+              <a:ext cx="4041491" cy="523220"/>
+            </a:xfrm>
+            <a:prstGeom prst="rect">
+              <a:avLst/>
+            </a:prstGeom>
+            <a:noFill/>
+          </p:spPr>
+          <p:txBody>
+            <a:bodyPr wrap="none" rtlCol="0">
+              <a:spAutoFit/>
+            </a:bodyPr>
+            <a:lstStyle/>
+            <a:p>
+              <a:r>
+                <a:rPr lang="en-GB" sz="2800" dirty="0">
+                  <a:solidFill>
+                    <a:schemeClr val="bg1">
+                      <a:lumMod val="95000"/>
+                      <a:lumOff val="5000"/>
+                    </a:schemeClr>
+                  </a:solidFill>
+                  <a:latin typeface="Arial" panose="020B0604020202020204" pitchFamily="34" charset="0"/>
+                  <a:cs typeface="Arial" panose="020B0604020202020204" pitchFamily="34" charset="0"/>
+                </a:rPr>
+                <a:t>[Right Click to Continue]</a:t>
+              </a:r>
+            </a:p>
+          </p:txBody>
+        </p:sp>
+        <p:sp>
+          <p:nvSpPr>
+            <p:cNvPr id="12" name="TextBox 11">
+              <a:extLst>
+                <a:ext uri="{FF2B5EF4-FFF2-40B4-BE49-F238E27FC236}">
+                  <a16:creationId xmlns:a16="http://schemas.microsoft.com/office/drawing/2014/main" id="{6D791DFD-01E4-469D-A96A-E86F379C86DC}"/>
+                </a:ext>
+              </a:extLst>
+            </p:cNvPr>
+            <p:cNvSpPr txBox="1"/>
+            <p:nvPr/>
+          </p:nvSpPr>
+          <p:spPr>
+            <a:xfrm>
+              <a:off x="240646" y="6105381"/>
+              <a:ext cx="3736920" cy="523220"/>
+            </a:xfrm>
+            <a:prstGeom prst="rect">
+              <a:avLst/>
+            </a:prstGeom>
+            <a:noFill/>
+          </p:spPr>
+          <p:txBody>
+            <a:bodyPr wrap="none" rtlCol="0">
+              <a:spAutoFit/>
+            </a:bodyPr>
+            <a:lstStyle/>
+            <a:p>
+              <a:r>
+                <a:rPr lang="en-GB" sz="2800" dirty="0">
+                  <a:solidFill>
+                    <a:schemeClr val="bg1">
+                      <a:lumMod val="95000"/>
+                      <a:lumOff val="5000"/>
+                    </a:schemeClr>
+                  </a:solidFill>
+                  <a:latin typeface="Arial" panose="020B0604020202020204" pitchFamily="34" charset="0"/>
+                  <a:cs typeface="Arial" panose="020B0604020202020204" pitchFamily="34" charset="0"/>
+                </a:rPr>
+                <a:t>[Left Click to Go Back]</a:t>
+              </a:r>
+            </a:p>
+          </p:txBody>
+        </p:sp>
+      </p:grpSp>
     </p:spTree>
     <p:extLst>
       <p:ext uri="{BB962C8B-B14F-4D97-AF65-F5344CB8AC3E}">
@@ -10429,50 +10884,6 @@
       </p:sp>
       <p:sp>
         <p:nvSpPr>
-          <p:cNvPr id="8" name="TextBox 7">
-            <a:extLst>
-              <a:ext uri="{FF2B5EF4-FFF2-40B4-BE49-F238E27FC236}">
-                <a16:creationId xmlns:a16="http://schemas.microsoft.com/office/drawing/2014/main" id="{117F54E8-BE30-F947-9A67-DA66FBF979BB}"/>
-              </a:ext>
-            </a:extLst>
-          </p:cNvPr>
-          <p:cNvSpPr txBox="1"/>
-          <p:nvPr/>
-        </p:nvSpPr>
-        <p:spPr>
-          <a:xfrm>
-            <a:off x="3062686" y="6213220"/>
-            <a:ext cx="3102131" cy="523220"/>
-          </a:xfrm>
-          <a:prstGeom prst="rect">
-            <a:avLst/>
-          </a:prstGeom>
-          <a:noFill/>
-        </p:spPr>
-        <p:txBody>
-          <a:bodyPr wrap="none" rtlCol="0">
-            <a:spAutoFit/>
-          </a:bodyPr>
-          <a:lstStyle/>
-          <a:p>
-            <a:r>
-              <a:rPr lang="en-GB" sz="2800" dirty="0">
-                <a:solidFill>
-                  <a:schemeClr val="bg1">
-                    <a:lumMod val="95000"/>
-                    <a:lumOff val="5000"/>
-                  </a:schemeClr>
-                </a:solidFill>
-                <a:latin typeface="Arial" panose="020B0604020202020204" pitchFamily="34" charset="0"/>
-                <a:cs typeface="Arial" panose="020B0604020202020204" pitchFamily="34" charset="0"/>
-              </a:rPr>
-              <a:t>[Click to Continue]</a:t>
-            </a:r>
-          </a:p>
-        </p:txBody>
-      </p:sp>
-      <p:sp>
-        <p:nvSpPr>
           <p:cNvPr id="10" name="Rounded Rectangle 9">
             <a:extLst>
               <a:ext uri="{FF2B5EF4-FFF2-40B4-BE49-F238E27FC236}">
@@ -10790,6 +11201,115 @@
           </a:p>
         </p:txBody>
       </p:sp>
+      <p:grpSp>
+        <p:nvGrpSpPr>
+          <p:cNvPr id="21" name="Group 20">
+            <a:extLst>
+              <a:ext uri="{FF2B5EF4-FFF2-40B4-BE49-F238E27FC236}">
+                <a16:creationId xmlns:a16="http://schemas.microsoft.com/office/drawing/2014/main" id="{241BF670-FF43-42C5-9FA3-A66C07B2C68D}"/>
+              </a:ext>
+            </a:extLst>
+          </p:cNvPr>
+          <p:cNvGrpSpPr/>
+          <p:nvPr/>
+        </p:nvGrpSpPr>
+        <p:grpSpPr>
+          <a:xfrm>
+            <a:off x="262437" y="6220300"/>
+            <a:ext cx="8702628" cy="523220"/>
+            <a:chOff x="240646" y="6105381"/>
+            <a:chExt cx="8702628" cy="523220"/>
+          </a:xfrm>
+        </p:grpSpPr>
+        <p:sp>
+          <p:nvSpPr>
+            <p:cNvPr id="22" name="TextBox 21">
+              <a:extLst>
+                <a:ext uri="{FF2B5EF4-FFF2-40B4-BE49-F238E27FC236}">
+                  <a16:creationId xmlns:a16="http://schemas.microsoft.com/office/drawing/2014/main" id="{2B976665-1809-4442-9F4E-42762774D4AB}"/>
+                </a:ext>
+              </a:extLst>
+            </p:cNvPr>
+            <p:cNvSpPr txBox="1"/>
+            <p:nvPr/>
+          </p:nvSpPr>
+          <p:spPr>
+            <a:xfrm>
+              <a:off x="4901783" y="6105381"/>
+              <a:ext cx="4041491" cy="523220"/>
+            </a:xfrm>
+            <a:prstGeom prst="rect">
+              <a:avLst/>
+            </a:prstGeom>
+            <a:noFill/>
+          </p:spPr>
+          <p:txBody>
+            <a:bodyPr wrap="none" rtlCol="0">
+              <a:spAutoFit/>
+            </a:bodyPr>
+            <a:lstStyle/>
+            <a:p>
+              <a:r>
+                <a:rPr lang="en-GB" sz="2800" dirty="0">
+                  <a:solidFill>
+                    <a:schemeClr val="bg1">
+                      <a:lumMod val="95000"/>
+                      <a:lumOff val="5000"/>
+                    </a:schemeClr>
+                  </a:solidFill>
+                  <a:latin typeface="Arial" panose="020B0604020202020204" pitchFamily="34" charset="0"/>
+                  <a:cs typeface="Arial" panose="020B0604020202020204" pitchFamily="34" charset="0"/>
+                </a:rPr>
+                <a:t>[Right Click to Continue]</a:t>
+              </a:r>
+            </a:p>
+          </p:txBody>
+        </p:sp>
+        <p:sp>
+          <p:nvSpPr>
+            <p:cNvPr id="23" name="TextBox 22">
+              <a:extLst>
+                <a:ext uri="{FF2B5EF4-FFF2-40B4-BE49-F238E27FC236}">
+                  <a16:creationId xmlns:a16="http://schemas.microsoft.com/office/drawing/2014/main" id="{AF0E5638-0173-403B-928E-8ED4E0316AD7}"/>
+                </a:ext>
+              </a:extLst>
+            </p:cNvPr>
+            <p:cNvSpPr txBox="1"/>
+            <p:nvPr/>
+          </p:nvSpPr>
+          <p:spPr>
+            <a:xfrm>
+              <a:off x="240646" y="6105381"/>
+              <a:ext cx="3736920" cy="523220"/>
+            </a:xfrm>
+            <a:prstGeom prst="rect">
+              <a:avLst/>
+            </a:prstGeom>
+            <a:noFill/>
+          </p:spPr>
+          <p:txBody>
+            <a:bodyPr wrap="none" rtlCol="0">
+              <a:spAutoFit/>
+            </a:bodyPr>
+            <a:lstStyle/>
+            <a:p>
+              <a:r>
+                <a:rPr lang="en-GB" sz="2800" dirty="0">
+                  <a:solidFill>
+                    <a:schemeClr val="bg1">
+                      <a:lumMod val="95000"/>
+                      <a:lumOff val="5000"/>
+                    </a:schemeClr>
+                  </a:solidFill>
+                  <a:latin typeface="Arial" panose="020B0604020202020204" pitchFamily="34" charset="0"/>
+                  <a:cs typeface="Arial" panose="020B0604020202020204" pitchFamily="34" charset="0"/>
+                </a:rPr>
+                <a:t>[Left Click to Go Back]</a:t>
+              </a:r>
+            </a:p>
+          </p:txBody>
+        </p:sp>
+      </p:grpSp>
     </p:spTree>
     <p:extLst>
       <p:ext uri="{BB962C8B-B14F-4D97-AF65-F5344CB8AC3E}">
@@ -11215,50 +11735,6 @@
       </p:sp>
       <p:sp>
         <p:nvSpPr>
-          <p:cNvPr id="8" name="TextBox 7">
-            <a:extLst>
-              <a:ext uri="{FF2B5EF4-FFF2-40B4-BE49-F238E27FC236}">
-                <a16:creationId xmlns:a16="http://schemas.microsoft.com/office/drawing/2014/main" id="{117F54E8-BE30-F947-9A67-DA66FBF979BB}"/>
-              </a:ext>
-            </a:extLst>
-          </p:cNvPr>
-          <p:cNvSpPr txBox="1"/>
-          <p:nvPr/>
-        </p:nvSpPr>
-        <p:spPr>
-          <a:xfrm>
-            <a:off x="3062686" y="6213220"/>
-            <a:ext cx="3102131" cy="523220"/>
-          </a:xfrm>
-          <a:prstGeom prst="rect">
-            <a:avLst/>
-          </a:prstGeom>
-          <a:noFill/>
-        </p:spPr>
-        <p:txBody>
-          <a:bodyPr wrap="none" rtlCol="0">
-            <a:spAutoFit/>
-          </a:bodyPr>
-          <a:lstStyle/>
-          <a:p>
-            <a:r>
-              <a:rPr lang="en-GB" sz="2800" dirty="0">
-                <a:solidFill>
-                  <a:schemeClr val="bg1">
-                    <a:lumMod val="95000"/>
-                    <a:lumOff val="5000"/>
-                  </a:schemeClr>
-                </a:solidFill>
-                <a:latin typeface="Arial" panose="020B0604020202020204" pitchFamily="34" charset="0"/>
-                <a:cs typeface="Arial" panose="020B0604020202020204" pitchFamily="34" charset="0"/>
-              </a:rPr>
-              <a:t>[Click to Continue]</a:t>
-            </a:r>
-          </a:p>
-        </p:txBody>
-      </p:sp>
-      <p:sp>
-        <p:nvSpPr>
           <p:cNvPr id="10" name="Rounded Rectangle 9">
             <a:extLst>
               <a:ext uri="{FF2B5EF4-FFF2-40B4-BE49-F238E27FC236}">
@@ -11576,6 +12052,115 @@
           </a:p>
         </p:txBody>
       </p:sp>
+      <p:grpSp>
+        <p:nvGrpSpPr>
+          <p:cNvPr id="21" name="Group 20">
+            <a:extLst>
+              <a:ext uri="{FF2B5EF4-FFF2-40B4-BE49-F238E27FC236}">
+                <a16:creationId xmlns:a16="http://schemas.microsoft.com/office/drawing/2014/main" id="{48C761B6-9B01-4890-9999-B6CF8BC2CCB4}"/>
+              </a:ext>
+            </a:extLst>
+          </p:cNvPr>
+          <p:cNvGrpSpPr/>
+          <p:nvPr/>
+        </p:nvGrpSpPr>
+        <p:grpSpPr>
+          <a:xfrm>
+            <a:off x="292694" y="6213220"/>
+            <a:ext cx="8702628" cy="523220"/>
+            <a:chOff x="240646" y="6105381"/>
+            <a:chExt cx="8702628" cy="523220"/>
+          </a:xfrm>
+        </p:grpSpPr>
+        <p:sp>
+          <p:nvSpPr>
+            <p:cNvPr id="22" name="TextBox 21">
+              <a:extLst>
+                <a:ext uri="{FF2B5EF4-FFF2-40B4-BE49-F238E27FC236}">
+                  <a16:creationId xmlns:a16="http://schemas.microsoft.com/office/drawing/2014/main" id="{AC050173-2296-42D9-9088-5D68E351C826}"/>
+                </a:ext>
+              </a:extLst>
+            </p:cNvPr>
+            <p:cNvSpPr txBox="1"/>
+            <p:nvPr/>
+          </p:nvSpPr>
+          <p:spPr>
+            <a:xfrm>
+              <a:off x="4901783" y="6105381"/>
+              <a:ext cx="4041491" cy="523220"/>
+            </a:xfrm>
+            <a:prstGeom prst="rect">
+              <a:avLst/>
+            </a:prstGeom>
+            <a:noFill/>
+          </p:spPr>
+          <p:txBody>
+            <a:bodyPr wrap="none" rtlCol="0">
+              <a:spAutoFit/>
+            </a:bodyPr>
+            <a:lstStyle/>
+            <a:p>
+              <a:r>
+                <a:rPr lang="en-GB" sz="2800" dirty="0">
+                  <a:solidFill>
+                    <a:schemeClr val="bg1">
+                      <a:lumMod val="95000"/>
+                      <a:lumOff val="5000"/>
+                    </a:schemeClr>
+                  </a:solidFill>
+                  <a:latin typeface="Arial" panose="020B0604020202020204" pitchFamily="34" charset="0"/>
+                  <a:cs typeface="Arial" panose="020B0604020202020204" pitchFamily="34" charset="0"/>
+                </a:rPr>
+                <a:t>[Right Click to Continue]</a:t>
+              </a:r>
+            </a:p>
+          </p:txBody>
+        </p:sp>
+        <p:sp>
+          <p:nvSpPr>
+            <p:cNvPr id="23" name="TextBox 22">
+              <a:extLst>
+                <a:ext uri="{FF2B5EF4-FFF2-40B4-BE49-F238E27FC236}">
+                  <a16:creationId xmlns:a16="http://schemas.microsoft.com/office/drawing/2014/main" id="{A3E4416A-71C4-44E4-AE46-ACE4675837E5}"/>
+                </a:ext>
+              </a:extLst>
+            </p:cNvPr>
+            <p:cNvSpPr txBox="1"/>
+            <p:nvPr/>
+          </p:nvSpPr>
+          <p:spPr>
+            <a:xfrm>
+              <a:off x="240646" y="6105381"/>
+              <a:ext cx="3736920" cy="523220"/>
+            </a:xfrm>
+            <a:prstGeom prst="rect">
+              <a:avLst/>
+            </a:prstGeom>
+            <a:noFill/>
+          </p:spPr>
+          <p:txBody>
+            <a:bodyPr wrap="none" rtlCol="0">
+              <a:spAutoFit/>
+            </a:bodyPr>
+            <a:lstStyle/>
+            <a:p>
+              <a:r>
+                <a:rPr lang="en-GB" sz="2800" dirty="0">
+                  <a:solidFill>
+                    <a:schemeClr val="bg1">
+                      <a:lumMod val="95000"/>
+                      <a:lumOff val="5000"/>
+                    </a:schemeClr>
+                  </a:solidFill>
+                  <a:latin typeface="Arial" panose="020B0604020202020204" pitchFamily="34" charset="0"/>
+                  <a:cs typeface="Arial" panose="020B0604020202020204" pitchFamily="34" charset="0"/>
+                </a:rPr>
+                <a:t>[Left Click to Go Back]</a:t>
+              </a:r>
+            </a:p>
+          </p:txBody>
+        </p:sp>
+      </p:grpSp>
     </p:spTree>
     <p:extLst>
       <p:ext uri="{BB962C8B-B14F-4D97-AF65-F5344CB8AC3E}">
@@ -11906,50 +12491,6 @@
       </p:pic>
       <p:sp>
         <p:nvSpPr>
-          <p:cNvPr id="8" name="TextBox 7">
-            <a:extLst>
-              <a:ext uri="{FF2B5EF4-FFF2-40B4-BE49-F238E27FC236}">
-                <a16:creationId xmlns:a16="http://schemas.microsoft.com/office/drawing/2014/main" id="{117F54E8-BE30-F947-9A67-DA66FBF979BB}"/>
-              </a:ext>
-            </a:extLst>
-          </p:cNvPr>
-          <p:cNvSpPr txBox="1"/>
-          <p:nvPr/>
-        </p:nvSpPr>
-        <p:spPr>
-          <a:xfrm>
-            <a:off x="3062686" y="6213220"/>
-            <a:ext cx="3102131" cy="523220"/>
-          </a:xfrm>
-          <a:prstGeom prst="rect">
-            <a:avLst/>
-          </a:prstGeom>
-          <a:noFill/>
-        </p:spPr>
-        <p:txBody>
-          <a:bodyPr wrap="none" rtlCol="0">
-            <a:spAutoFit/>
-          </a:bodyPr>
-          <a:lstStyle/>
-          <a:p>
-            <a:r>
-              <a:rPr lang="en-GB" sz="2800" dirty="0">
-                <a:solidFill>
-                  <a:schemeClr val="bg1">
-                    <a:lumMod val="95000"/>
-                    <a:lumOff val="5000"/>
-                  </a:schemeClr>
-                </a:solidFill>
-                <a:latin typeface="Arial" panose="020B0604020202020204" pitchFamily="34" charset="0"/>
-                <a:cs typeface="Arial" panose="020B0604020202020204" pitchFamily="34" charset="0"/>
-              </a:rPr>
-              <a:t>[Click to Continue]</a:t>
-            </a:r>
-          </a:p>
-        </p:txBody>
-      </p:sp>
-      <p:sp>
-        <p:nvSpPr>
           <p:cNvPr id="10" name="Rounded Rectangle 9">
             <a:extLst>
               <a:ext uri="{FF2B5EF4-FFF2-40B4-BE49-F238E27FC236}">
@@ -12645,6 +13186,115 @@
           </a:p>
         </p:txBody>
       </p:sp>
+      <p:grpSp>
+        <p:nvGrpSpPr>
+          <p:cNvPr id="25" name="Group 24">
+            <a:extLst>
+              <a:ext uri="{FF2B5EF4-FFF2-40B4-BE49-F238E27FC236}">
+                <a16:creationId xmlns:a16="http://schemas.microsoft.com/office/drawing/2014/main" id="{7A6ACB4D-998F-433F-9C1B-6B0D0C42BA40}"/>
+              </a:ext>
+            </a:extLst>
+          </p:cNvPr>
+          <p:cNvGrpSpPr/>
+          <p:nvPr/>
+        </p:nvGrpSpPr>
+        <p:grpSpPr>
+          <a:xfrm>
+            <a:off x="262437" y="6217969"/>
+            <a:ext cx="8702628" cy="523220"/>
+            <a:chOff x="240646" y="6105381"/>
+            <a:chExt cx="8702628" cy="523220"/>
+          </a:xfrm>
+        </p:grpSpPr>
+        <p:sp>
+          <p:nvSpPr>
+            <p:cNvPr id="27" name="TextBox 26">
+              <a:extLst>
+                <a:ext uri="{FF2B5EF4-FFF2-40B4-BE49-F238E27FC236}">
+                  <a16:creationId xmlns:a16="http://schemas.microsoft.com/office/drawing/2014/main" id="{B798B16D-0DB0-41DF-B864-24ECDBD951F8}"/>
+                </a:ext>
+              </a:extLst>
+            </p:cNvPr>
+            <p:cNvSpPr txBox="1"/>
+            <p:nvPr/>
+          </p:nvSpPr>
+          <p:spPr>
+            <a:xfrm>
+              <a:off x="4901783" y="6105381"/>
+              <a:ext cx="4041491" cy="523220"/>
+            </a:xfrm>
+            <a:prstGeom prst="rect">
+              <a:avLst/>
+            </a:prstGeom>
+            <a:noFill/>
+          </p:spPr>
+          <p:txBody>
+            <a:bodyPr wrap="none" rtlCol="0">
+              <a:spAutoFit/>
+            </a:bodyPr>
+            <a:lstStyle/>
+            <a:p>
+              <a:r>
+                <a:rPr lang="en-GB" sz="2800" dirty="0">
+                  <a:solidFill>
+                    <a:schemeClr val="bg1">
+                      <a:lumMod val="95000"/>
+                      <a:lumOff val="5000"/>
+                    </a:schemeClr>
+                  </a:solidFill>
+                  <a:latin typeface="Arial" panose="020B0604020202020204" pitchFamily="34" charset="0"/>
+                  <a:cs typeface="Arial" panose="020B0604020202020204" pitchFamily="34" charset="0"/>
+                </a:rPr>
+                <a:t>[Right Click to Continue]</a:t>
+              </a:r>
+            </a:p>
+          </p:txBody>
+        </p:sp>
+        <p:sp>
+          <p:nvSpPr>
+            <p:cNvPr id="28" name="TextBox 27">
+              <a:extLst>
+                <a:ext uri="{FF2B5EF4-FFF2-40B4-BE49-F238E27FC236}">
+                  <a16:creationId xmlns:a16="http://schemas.microsoft.com/office/drawing/2014/main" id="{92EC56EF-4867-4CD8-B5EE-90F4D48D4BD5}"/>
+                </a:ext>
+              </a:extLst>
+            </p:cNvPr>
+            <p:cNvSpPr txBox="1"/>
+            <p:nvPr/>
+          </p:nvSpPr>
+          <p:spPr>
+            <a:xfrm>
+              <a:off x="240646" y="6105381"/>
+              <a:ext cx="3736920" cy="523220"/>
+            </a:xfrm>
+            <a:prstGeom prst="rect">
+              <a:avLst/>
+            </a:prstGeom>
+            <a:noFill/>
+          </p:spPr>
+          <p:txBody>
+            <a:bodyPr wrap="none" rtlCol="0">
+              <a:spAutoFit/>
+            </a:bodyPr>
+            <a:lstStyle/>
+            <a:p>
+              <a:r>
+                <a:rPr lang="en-GB" sz="2800" dirty="0">
+                  <a:solidFill>
+                    <a:schemeClr val="bg1">
+                      <a:lumMod val="95000"/>
+                      <a:lumOff val="5000"/>
+                    </a:schemeClr>
+                  </a:solidFill>
+                  <a:latin typeface="Arial" panose="020B0604020202020204" pitchFamily="34" charset="0"/>
+                  <a:cs typeface="Arial" panose="020B0604020202020204" pitchFamily="34" charset="0"/>
+                </a:rPr>
+                <a:t>[Left Click to Go Back]</a:t>
+              </a:r>
+            </a:p>
+          </p:txBody>
+        </p:sp>
+      </p:grpSp>
     </p:spTree>
     <p:extLst>
       <p:ext uri="{BB962C8B-B14F-4D97-AF65-F5344CB8AC3E}">

</xml_diff>

<commit_message>
Keep font size at 18, corrected instructs, removed beeper
</commit_message>
<xml_diff>
--- a/Instructions/instructions_adapted.pptx
+++ b/Instructions/instructions_adapted.pptx
@@ -226,7 +226,7 @@
           <a:p>
             <a:fld id="{2C27CEE3-7CDA-4780-9F85-765E50CB07F7}" type="datetimeFigureOut">
               <a:rPr lang="en-GB" smtClean="0"/>
-              <a:t>11/11/2021</a:t>
+              <a:t>22/11/2021</a:t>
             </a:fld>
             <a:endParaRPr lang="en-GB"/>
           </a:p>
@@ -675,7 +675,7 @@
           <a:p>
             <a:fld id="{0F3A0F3E-9580-46AF-A1DB-5E4659722DCF}" type="datetimeFigureOut">
               <a:rPr lang="en-GB" smtClean="0"/>
-              <a:t>11/11/2021</a:t>
+              <a:t>22/11/2021</a:t>
             </a:fld>
             <a:endParaRPr lang="en-GB"/>
           </a:p>
@@ -845,7 +845,7 @@
           <a:p>
             <a:fld id="{0F3A0F3E-9580-46AF-A1DB-5E4659722DCF}" type="datetimeFigureOut">
               <a:rPr lang="en-GB" smtClean="0"/>
-              <a:t>11/11/2021</a:t>
+              <a:t>22/11/2021</a:t>
             </a:fld>
             <a:endParaRPr lang="en-GB"/>
           </a:p>
@@ -1025,7 +1025,7 @@
           <a:p>
             <a:fld id="{0F3A0F3E-9580-46AF-A1DB-5E4659722DCF}" type="datetimeFigureOut">
               <a:rPr lang="en-GB" smtClean="0"/>
-              <a:t>11/11/2021</a:t>
+              <a:t>22/11/2021</a:t>
             </a:fld>
             <a:endParaRPr lang="en-GB"/>
           </a:p>
@@ -1195,7 +1195,7 @@
           <a:p>
             <a:fld id="{0F3A0F3E-9580-46AF-A1DB-5E4659722DCF}" type="datetimeFigureOut">
               <a:rPr lang="en-GB" smtClean="0"/>
-              <a:t>11/11/2021</a:t>
+              <a:t>22/11/2021</a:t>
             </a:fld>
             <a:endParaRPr lang="en-GB"/>
           </a:p>
@@ -1441,7 +1441,7 @@
           <a:p>
             <a:fld id="{0F3A0F3E-9580-46AF-A1DB-5E4659722DCF}" type="datetimeFigureOut">
               <a:rPr lang="en-GB" smtClean="0"/>
-              <a:t>11/11/2021</a:t>
+              <a:t>22/11/2021</a:t>
             </a:fld>
             <a:endParaRPr lang="en-GB"/>
           </a:p>
@@ -1729,7 +1729,7 @@
           <a:p>
             <a:fld id="{0F3A0F3E-9580-46AF-A1DB-5E4659722DCF}" type="datetimeFigureOut">
               <a:rPr lang="en-GB" smtClean="0"/>
-              <a:t>11/11/2021</a:t>
+              <a:t>22/11/2021</a:t>
             </a:fld>
             <a:endParaRPr lang="en-GB"/>
           </a:p>
@@ -2151,7 +2151,7 @@
           <a:p>
             <a:fld id="{0F3A0F3E-9580-46AF-A1DB-5E4659722DCF}" type="datetimeFigureOut">
               <a:rPr lang="en-GB" smtClean="0"/>
-              <a:t>11/11/2021</a:t>
+              <a:t>22/11/2021</a:t>
             </a:fld>
             <a:endParaRPr lang="en-GB"/>
           </a:p>
@@ -2269,7 +2269,7 @@
           <a:p>
             <a:fld id="{0F3A0F3E-9580-46AF-A1DB-5E4659722DCF}" type="datetimeFigureOut">
               <a:rPr lang="en-GB" smtClean="0"/>
-              <a:t>11/11/2021</a:t>
+              <a:t>22/11/2021</a:t>
             </a:fld>
             <a:endParaRPr lang="en-GB"/>
           </a:p>
@@ -2364,7 +2364,7 @@
           <a:p>
             <a:fld id="{0F3A0F3E-9580-46AF-A1DB-5E4659722DCF}" type="datetimeFigureOut">
               <a:rPr lang="en-GB" smtClean="0"/>
-              <a:t>11/11/2021</a:t>
+              <a:t>22/11/2021</a:t>
             </a:fld>
             <a:endParaRPr lang="en-GB"/>
           </a:p>
@@ -2641,7 +2641,7 @@
           <a:p>
             <a:fld id="{0F3A0F3E-9580-46AF-A1DB-5E4659722DCF}" type="datetimeFigureOut">
               <a:rPr lang="en-GB" smtClean="0"/>
-              <a:t>11/11/2021</a:t>
+              <a:t>22/11/2021</a:t>
             </a:fld>
             <a:endParaRPr lang="en-GB"/>
           </a:p>
@@ -2894,7 +2894,7 @@
           <a:p>
             <a:fld id="{0F3A0F3E-9580-46AF-A1DB-5E4659722DCF}" type="datetimeFigureOut">
               <a:rPr lang="en-GB" smtClean="0"/>
-              <a:t>11/11/2021</a:t>
+              <a:t>22/11/2021</a:t>
             </a:fld>
             <a:endParaRPr lang="en-GB"/>
           </a:p>
@@ -3113,7 +3113,7 @@
           <a:p>
             <a:fld id="{0F3A0F3E-9580-46AF-A1DB-5E4659722DCF}" type="datetimeFigureOut">
               <a:rPr lang="en-GB" smtClean="0"/>
-              <a:t>11/11/2021</a:t>
+              <a:t>22/11/2021</a:t>
             </a:fld>
             <a:endParaRPr lang="en-GB"/>
           </a:p>
@@ -4381,19 +4381,16 @@
           </a:p>
           <a:p>
             <a:pPr algn="ctr"/>
-            <a:r>
-              <a:rPr lang="en-US" dirty="0">
-                <a:solidFill>
-                  <a:schemeClr val="bg1">
-                    <a:lumMod val="95000"/>
-                    <a:lumOff val="5000"/>
-                  </a:schemeClr>
-                </a:solidFill>
-                <a:latin typeface="Arial" panose="020B0604020202020204" pitchFamily="34" charset="0"/>
-                <a:cs typeface="Arial" panose="020B0604020202020204" pitchFamily="34" charset="0"/>
-              </a:rPr>
-              <a:t>.</a:t>
-            </a:r>
+            <a:endParaRPr lang="en-US" dirty="0">
+              <a:solidFill>
+                <a:schemeClr val="bg1">
+                  <a:lumMod val="95000"/>
+                  <a:lumOff val="5000"/>
+                </a:schemeClr>
+              </a:solidFill>
+              <a:latin typeface="Arial" panose="020B0604020202020204" pitchFamily="34" charset="0"/>
+              <a:cs typeface="Arial" panose="020B0604020202020204" pitchFamily="34" charset="0"/>
+            </a:endParaRPr>
           </a:p>
           <a:p>
             <a:pPr algn="ctr"/>

</xml_diff>